<commit_message>
Beautifulling the architecture diagram
</commit_message>
<xml_diff>
--- a/doc/presentation.pptx
+++ b/doc/presentation.pptx
@@ -4418,6 +4418,13 @@
   <p:clrMapOvr>
     <a:masterClrMapping/>
   </p:clrMapOvr>
+  <p:timing>
+    <p:tnLst>
+      <p:par>
+        <p:cTn id="1" dur="indefinite" restart="never" nodeType="tmRoot"/>
+      </p:par>
+    </p:tnLst>
+  </p:timing>
 </p:sld>
 </file>
 
@@ -4497,6 +4504,13 @@
   <p:clrMapOvr>
     <a:masterClrMapping/>
   </p:clrMapOvr>
+  <p:timing>
+    <p:tnLst>
+      <p:par>
+        <p:cTn id="1" dur="indefinite" restart="never" nodeType="tmRoot"/>
+      </p:par>
+    </p:tnLst>
+  </p:timing>
 </p:sld>
 </file>
 
@@ -4519,7 +4533,7 @@
       </p:grpSpPr>
       <p:pic>
         <p:nvPicPr>
-          <p:cNvPr id="1026" name="Picture 2" descr="C:\Users\guyomarch\Desktop\Aws reinvent\Hackathon\awsreinvent_t33\doc\AwsTeam33.png"/>
+          <p:cNvPr id="1027" name="Picture 3" descr="C:\Users\guyomarch\Desktop\Aws reinvent\Hackathon\awsreinvent_t33\doc\AwsTeam33.png"/>
           <p:cNvPicPr>
             <a:picLocks noChangeAspect="1" noChangeArrowheads="1"/>
           </p:cNvPicPr>
@@ -4540,8 +4554,8 @@
         </p:blipFill>
         <p:spPr bwMode="auto">
           <a:xfrm>
-            <a:off x="-684584" y="-1467544"/>
-            <a:ext cx="10067925" cy="10067925"/>
+            <a:off x="611560" y="171454"/>
+            <a:ext cx="7920880" cy="6209874"/>
           </a:xfrm>
           <a:prstGeom prst="rect">
             <a:avLst/>
@@ -4568,6 +4582,13 @@
   <p:clrMapOvr>
     <a:masterClrMapping/>
   </p:clrMapOvr>
+  <p:timing>
+    <p:tnLst>
+      <p:par>
+        <p:cTn id="1" dur="indefinite" restart="never" nodeType="tmRoot"/>
+      </p:par>
+    </p:tnLst>
+  </p:timing>
 </p:sld>
 </file>
 
@@ -4689,6 +4710,13 @@
   <p:clrMapOvr>
     <a:masterClrMapping/>
   </p:clrMapOvr>
+  <p:timing>
+    <p:tnLst>
+      <p:par>
+        <p:cTn id="1" dur="indefinite" restart="never" nodeType="tmRoot"/>
+      </p:par>
+    </p:tnLst>
+  </p:timing>
 </p:sld>
 </file>
 

</xml_diff>